<commit_message>
Update presentation with finishing slide
</commit_message>
<xml_diff>
--- a/doc/Presentation/Uniatron-Presentation1207.pptx
+++ b/doc/Presentation/Uniatron-Presentation1207.pptx
@@ -11,6 +11,7 @@
     <p:sldId id="267" r:id="rId5"/>
     <p:sldId id="268" r:id="rId6"/>
     <p:sldId id="269" r:id="rId7"/>
+    <p:sldId id="270" r:id="rId8"/>
   </p:sldIdLst>
   <p:sldSz cx="12192000" cy="6858000"/>
   <p:notesSz cx="6858000" cy="9144000"/>
@@ -14035,6 +14036,217 @@
 </p:sld>
 </file>
 
+<file path=ppt/slides/slide7.xml><?xml version="1.0" encoding="utf-8"?>
+<p:sld xmlns:a="http://schemas.openxmlformats.org/drawingml/2006/main" xmlns:r="http://schemas.openxmlformats.org/officeDocument/2006/relationships" xmlns:p="http://schemas.openxmlformats.org/presentationml/2006/main">
+  <p:cSld>
+    <p:bg>
+      <p:bgPr>
+        <a:solidFill>
+          <a:schemeClr val="tx1"/>
+        </a:solidFill>
+        <a:effectLst/>
+      </p:bgPr>
+    </p:bg>
+    <p:spTree>
+      <p:nvGrpSpPr>
+        <p:cNvPr id="1" name=""/>
+        <p:cNvGrpSpPr/>
+        <p:nvPr/>
+      </p:nvGrpSpPr>
+      <p:grpSpPr>
+        <a:xfrm>
+          <a:off x="0" y="0"/>
+          <a:ext cx="0" cy="0"/>
+          <a:chOff x="0" y="0"/>
+          <a:chExt cx="0" cy="0"/>
+        </a:xfrm>
+      </p:grpSpPr>
+      <p:sp>
+        <p:nvSpPr>
+          <p:cNvPr id="13" name="Isosceles Triangle 12">
+            <a:extLst>
+              <a:ext uri="{FF2B5EF4-FFF2-40B4-BE49-F238E27FC236}">
+                <a16:creationId xmlns:a16="http://schemas.microsoft.com/office/drawing/2014/main" id="{5A7802B6-FF37-40CF-A7E2-6F2A0D9A91EF}"/>
+              </a:ext>
+              <a:ext uri="{C183D7F6-B498-43B3-948B-1728B52AA6E4}">
+                <adec:decorative xmlns:adec="http://schemas.microsoft.com/office/drawing/2017/decorative" val="1"/>
+              </a:ext>
+            </a:extLst>
+          </p:cNvPr>
+          <p:cNvSpPr>
+            <a:spLocks noGrp="1" noRot="1" noChangeAspect="1" noMove="1" noResize="1" noEditPoints="1" noAdjustHandles="1" noChangeArrowheads="1" noChangeShapeType="1" noTextEdit="1"/>
+          </p:cNvSpPr>
+          <p:nvPr>
+            <p:extLst>
+              <p:ext uri="{386F3935-93C4-4BCD-93E2-E3B085C9AB24}">
+                <p16:designElem xmlns:p16="http://schemas.microsoft.com/office/powerpoint/2015/main" val="1"/>
+              </p:ext>
+            </p:extLst>
+          </p:nvPr>
+        </p:nvSpPr>
+        <p:spPr>
+          <a:xfrm rot="10800000">
+            <a:off x="3174" y="12700"/>
+            <a:ext cx="842596" cy="5666154"/>
+          </a:xfrm>
+          <a:prstGeom prst="triangle">
+            <a:avLst>
+              <a:gd name="adj" fmla="val 100000"/>
+            </a:avLst>
+          </a:prstGeom>
+          <a:solidFill>
+            <a:schemeClr val="accent1">
+              <a:alpha val="85000"/>
+            </a:schemeClr>
+          </a:solidFill>
+          <a:ln>
+            <a:noFill/>
+          </a:ln>
+          <a:effectLst/>
+        </p:spPr>
+        <p:style>
+          <a:lnRef idx="1">
+            <a:schemeClr val="accent1"/>
+          </a:lnRef>
+          <a:fillRef idx="3">
+            <a:schemeClr val="accent1"/>
+          </a:fillRef>
+          <a:effectRef idx="2">
+            <a:schemeClr val="accent1"/>
+          </a:effectRef>
+          <a:fontRef idx="minor">
+            <a:schemeClr val="lt1"/>
+          </a:fontRef>
+        </p:style>
+      </p:sp>
+      <p:pic>
+        <p:nvPicPr>
+          <p:cNvPr id="7" name="Grafik 6">
+            <a:extLst>
+              <a:ext uri="{FF2B5EF4-FFF2-40B4-BE49-F238E27FC236}">
+                <a16:creationId xmlns:a16="http://schemas.microsoft.com/office/drawing/2014/main" id="{5677E999-16A7-44CC-99C6-AADFF4184A4F}"/>
+              </a:ext>
+            </a:extLst>
+          </p:cNvPr>
+          <p:cNvPicPr>
+            <a:picLocks noChangeAspect="1"/>
+          </p:cNvPicPr>
+          <p:nvPr/>
+        </p:nvPicPr>
+        <p:blipFill>
+          <a:blip r:embed="rId2"/>
+          <a:stretch>
+            <a:fillRect/>
+          </a:stretch>
+        </p:blipFill>
+        <p:spPr>
+          <a:xfrm>
+            <a:off x="888604" y="2703382"/>
+            <a:ext cx="3765692" cy="1459206"/>
+          </a:xfrm>
+          <a:prstGeom prst="rect">
+            <a:avLst/>
+          </a:prstGeom>
+        </p:spPr>
+      </p:pic>
+      <p:sp>
+        <p:nvSpPr>
+          <p:cNvPr id="4" name="Titel 3">
+            <a:extLst>
+              <a:ext uri="{FF2B5EF4-FFF2-40B4-BE49-F238E27FC236}">
+                <a16:creationId xmlns:a16="http://schemas.microsoft.com/office/drawing/2014/main" id="{41954FE1-CBAB-49BC-9560-3E8097D0944D}"/>
+              </a:ext>
+            </a:extLst>
+          </p:cNvPr>
+          <p:cNvSpPr>
+            <a:spLocks noGrp="1"/>
+          </p:cNvSpPr>
+          <p:nvPr>
+            <p:ph type="ctrTitle"/>
+          </p:nvPr>
+        </p:nvSpPr>
+        <p:spPr>
+          <a:xfrm>
+            <a:off x="4974337" y="1265314"/>
+            <a:ext cx="4299666" cy="3249131"/>
+          </a:xfrm>
+        </p:spPr>
+        <p:txBody>
+          <a:bodyPr>
+            <a:normAutofit/>
+          </a:bodyPr>
+          <a:lstStyle/>
+          <a:p>
+            <a:pPr algn="l"/>
+            <a:r>
+              <a:rPr lang="de-DE"/>
+              <a:t>Don‘t keep waiting…</a:t>
+            </a:r>
+          </a:p>
+        </p:txBody>
+      </p:sp>
+      <p:sp>
+        <p:nvSpPr>
+          <p:cNvPr id="8" name="Untertitel 7">
+            <a:extLst>
+              <a:ext uri="{FF2B5EF4-FFF2-40B4-BE49-F238E27FC236}">
+                <a16:creationId xmlns:a16="http://schemas.microsoft.com/office/drawing/2014/main" id="{E7F495B1-8F88-4317-A8F3-D57601DA9789}"/>
+              </a:ext>
+            </a:extLst>
+          </p:cNvPr>
+          <p:cNvSpPr>
+            <a:spLocks noGrp="1"/>
+          </p:cNvSpPr>
+          <p:nvPr>
+            <p:ph type="subTitle" idx="1"/>
+          </p:nvPr>
+        </p:nvSpPr>
+        <p:spPr>
+          <a:xfrm>
+            <a:off x="4974336" y="4514446"/>
+            <a:ext cx="4299666" cy="871042"/>
+          </a:xfrm>
+        </p:spPr>
+        <p:txBody>
+          <a:bodyPr>
+            <a:normAutofit/>
+          </a:bodyPr>
+          <a:lstStyle/>
+          <a:p>
+            <a:pPr algn="l"/>
+            <a:r>
+              <a:rPr lang="de-DE">
+                <a:solidFill>
+                  <a:schemeClr val="bg1">
+                    <a:lumMod val="95000"/>
+                  </a:schemeClr>
+                </a:solidFill>
+              </a:rPr>
+              <a:t>Start your new lifestyle today!</a:t>
+            </a:r>
+            <a:endParaRPr lang="de-DE" dirty="0">
+              <a:solidFill>
+                <a:schemeClr val="bg1">
+                  <a:lumMod val="95000"/>
+                </a:schemeClr>
+              </a:solidFill>
+            </a:endParaRPr>
+          </a:p>
+        </p:txBody>
+      </p:sp>
+    </p:spTree>
+    <p:extLst>
+      <p:ext uri="{BB962C8B-B14F-4D97-AF65-F5344CB8AC3E}">
+        <p14:creationId xmlns:p14="http://schemas.microsoft.com/office/powerpoint/2010/main" val="3151449363"/>
+      </p:ext>
+    </p:extLst>
+  </p:cSld>
+  <p:clrMapOvr>
+    <a:masterClrMapping/>
+  </p:clrMapOvr>
+</p:sld>
+</file>
+
 <file path=ppt/theme/theme1.xml><?xml version="1.0" encoding="utf-8"?>
 <a:theme xmlns:a="http://schemas.openxmlformats.org/drawingml/2006/main" name="Facette">
   <a:themeElements>

</xml_diff>